<commit_message>
GitBook: [master] 2 pages modified
</commit_message>
<xml_diff>
--- a/.gitbook/assets/chapter-04-1-kor.pptx
+++ b/.gitbook/assets/chapter-04-1-kor.pptx
@@ -563,7 +563,7 @@
               <a:pPr>
                 <a:defRPr/>
               </a:pPr>
-              <a:t>2020-01-08</a:t>
+              <a:t>2020-01-11</a:t>
             </a:fld>
             <a:endParaRPr lang="ko-KR" altLang="en-US"/>
           </a:p>
@@ -1020,36 +1020,6 @@
           </a:p>
         </p:txBody>
       </p:sp>
-      <p:pic>
-        <p:nvPicPr>
-          <p:cNvPr id="8" name="그림 7"/>
-          <p:cNvPicPr>
-            <a:picLocks noChangeAspect="1"/>
-          </p:cNvPicPr>
-          <p:nvPr userDrawn="1"/>
-        </p:nvPicPr>
-        <p:blipFill>
-          <a:blip r:embed="rId2" cstate="print">
-            <a:extLst>
-              <a:ext uri="{28A0092B-C50C-407E-A947-70E740481C1C}">
-                <a14:useLocalDpi xmlns:a14="http://schemas.microsoft.com/office/drawing/2010/main" val="0"/>
-              </a:ext>
-            </a:extLst>
-          </a:blip>
-          <a:stretch>
-            <a:fillRect/>
-          </a:stretch>
-        </p:blipFill>
-        <p:spPr>
-          <a:xfrm>
-            <a:off x="-108520" y="143635"/>
-            <a:ext cx="2255525" cy="1146050"/>
-          </a:xfrm>
-          <a:prstGeom prst="rect">
-            <a:avLst/>
-          </a:prstGeom>
-        </p:spPr>
-      </p:pic>
       <p:sp>
         <p:nvSpPr>
           <p:cNvPr id="71" name="정오각형 70"/>
@@ -1819,7 +1789,7 @@
               <a:pPr>
                 <a:defRPr/>
               </a:pPr>
-              <a:t>Wednesday, January 8, 2020</a:t>
+              <a:t>Saturday, January 11, 2020</a:t>
             </a:fld>
             <a:endParaRPr lang="en-US" dirty="0"/>
           </a:p>
@@ -2012,7 +1982,7 @@
               <a:pPr>
                 <a:defRPr/>
               </a:pPr>
-              <a:t>Wednesday, January 8, 2020</a:t>
+              <a:t>Saturday, January 11, 2020</a:t>
             </a:fld>
             <a:endParaRPr lang="en-US"/>
           </a:p>
@@ -2122,7 +2092,7 @@
               <a:pPr>
                 <a:defRPr/>
               </a:pPr>
-              <a:t>Wednesday, January 8, 2020</a:t>
+              <a:t>Saturday, January 11, 2020</a:t>
             </a:fld>
             <a:endParaRPr lang="en-US" dirty="0"/>
           </a:p>
@@ -2482,7 +2452,7 @@
               <a:pPr>
                 <a:defRPr/>
               </a:pPr>
-              <a:t>Wednesday, January 8, 2020</a:t>
+              <a:t>Saturday, January 11, 2020</a:t>
             </a:fld>
             <a:endParaRPr lang="en-US"/>
           </a:p>
@@ -2782,7 +2752,7 @@
               <a:pPr>
                 <a:defRPr/>
               </a:pPr>
-              <a:t>Wednesday, January 8, 2020</a:t>
+              <a:t>Saturday, January 11, 2020</a:t>
             </a:fld>
             <a:endParaRPr lang="en-US"/>
           </a:p>
@@ -3216,7 +3186,7 @@
               <a:pPr>
                 <a:defRPr/>
               </a:pPr>
-              <a:t>Wednesday, January 8, 2020</a:t>
+              <a:t>Saturday, January 11, 2020</a:t>
             </a:fld>
             <a:endParaRPr lang="en-US"/>
           </a:p>
@@ -3348,7 +3318,7 @@
               <a:pPr>
                 <a:defRPr/>
               </a:pPr>
-              <a:t>Wednesday, January 8, 2020</a:t>
+              <a:t>Saturday, January 11, 2020</a:t>
             </a:fld>
             <a:endParaRPr lang="en-US" dirty="0"/>
           </a:p>
@@ -3458,7 +3428,7 @@
               <a:pPr>
                 <a:defRPr/>
               </a:pPr>
-              <a:t>Wednesday, January 8, 2020</a:t>
+              <a:t>Saturday, January 11, 2020</a:t>
             </a:fld>
             <a:endParaRPr lang="en-US"/>
           </a:p>
@@ -3748,7 +3718,7 @@
               <a:pPr>
                 <a:defRPr/>
               </a:pPr>
-              <a:t>Wednesday, January 8, 2020</a:t>
+              <a:t>Saturday, January 11, 2020</a:t>
             </a:fld>
             <a:endParaRPr lang="en-US" dirty="0"/>
           </a:p>
@@ -4015,7 +3985,7 @@
               <a:pPr>
                 <a:defRPr/>
               </a:pPr>
-              <a:t>Wednesday, January 8, 2020</a:t>
+              <a:t>Saturday, January 11, 2020</a:t>
             </a:fld>
             <a:endParaRPr lang="en-US"/>
           </a:p>
@@ -4308,7 +4278,7 @@
               <a:pPr>
                 <a:defRPr/>
               </a:pPr>
-              <a:t>Wednesday, January 8, 2020</a:t>
+              <a:t>Saturday, January 11, 2020</a:t>
             </a:fld>
             <a:endParaRPr lang="en-US" dirty="0"/>
           </a:p>
@@ -4457,8 +4427,8 @@
         </p:nvSpPr>
         <p:spPr bwMode="auto">
           <a:xfrm>
-            <a:off x="8397425" y="6489340"/>
-            <a:ext cx="569387" cy="261610"/>
+            <a:off x="8391013" y="6489340"/>
+            <a:ext cx="575799" cy="253916"/>
           </a:xfrm>
           <a:prstGeom prst="rect">
             <a:avLst/>
@@ -4603,7 +4573,7 @@
               <a:defRPr/>
             </a:pPr>
             <a:fld id="{F60B237E-1E27-414E-981E-8B20D038C067}" type="slidenum">
-              <a:rPr lang="en-US" altLang="ko-KR" sz="1050" smtClean="0">
+              <a:rPr lang="en-US" altLang="ko-KR" sz="1050" b="1" smtClean="0">
                 <a:latin typeface="+mn-ea"/>
                 <a:ea typeface="+mn-ea"/>
               </a:rPr>
@@ -4613,12 +4583,16 @@
               <a:t>‹#›</a:t>
             </a:fld>
             <a:r>
-              <a:rPr lang="en-US" altLang="ko-KR" sz="1050" dirty="0">
+              <a:rPr lang="en-US" altLang="ko-KR" sz="1050" b="1" dirty="0" smtClean="0">
                 <a:latin typeface="+mn-ea"/>
                 <a:ea typeface="+mn-ea"/>
               </a:rPr>
-              <a:t>/31</a:t>
-            </a:r>
+              <a:t>/13</a:t>
+            </a:r>
+            <a:endParaRPr lang="en-US" altLang="ko-KR" sz="1050" b="1" dirty="0">
+              <a:latin typeface="+mn-ea"/>
+              <a:ea typeface="+mn-ea"/>
+            </a:endParaRPr>
           </a:p>
         </p:txBody>
       </p:sp>
@@ -5435,7 +5409,7 @@
           <a:graphicData uri="http://schemas.openxmlformats.org/presentationml/2006/ole">
             <mc:AlternateContent xmlns:mc="http://schemas.openxmlformats.org/markup-compatibility/2006">
               <mc:Choice xmlns:v="urn:schemas-microsoft-com:vml" Requires="v">
-                <p:oleObj spid="_x0000_s3074" name="Equation" r:id="rId3" imgW="3111480" imgH="596880" progId="Equation.DSMT4">
+                <p:oleObj spid="_x0000_s3086" name="Equation" r:id="rId3" imgW="3111480" imgH="596880" progId="Equation.DSMT4">
                   <p:embed/>
                 </p:oleObj>
               </mc:Choice>
@@ -5524,7 +5498,7 @@
           <a:graphicData uri="http://schemas.openxmlformats.org/presentationml/2006/ole">
             <mc:AlternateContent xmlns:mc="http://schemas.openxmlformats.org/markup-compatibility/2006">
               <mc:Choice xmlns:v="urn:schemas-microsoft-com:vml" Requires="v">
-                <p:oleObj spid="_x0000_s3075" name="Equation" r:id="rId5" imgW="3035160" imgH="596880" progId="Equation.DSMT4">
+                <p:oleObj spid="_x0000_s3087" name="Equation" r:id="rId5" imgW="3035160" imgH="596880" progId="Equation.DSMT4">
                   <p:embed/>
                 </p:oleObj>
               </mc:Choice>
@@ -5613,7 +5587,7 @@
           <a:graphicData uri="http://schemas.openxmlformats.org/presentationml/2006/ole">
             <mc:AlternateContent xmlns:mc="http://schemas.openxmlformats.org/markup-compatibility/2006">
               <mc:Choice xmlns:v="urn:schemas-microsoft-com:vml" Requires="v">
-                <p:oleObj spid="_x0000_s3076" name="Equation" r:id="rId7" imgW="2831760" imgH="406080" progId="Equation.DSMT4">
+                <p:oleObj spid="_x0000_s3088" name="Equation" r:id="rId7" imgW="2831760" imgH="406080" progId="Equation.DSMT4">
                   <p:embed/>
                 </p:oleObj>
               </mc:Choice>
@@ -5702,7 +5676,7 @@
           <a:graphicData uri="http://schemas.openxmlformats.org/presentationml/2006/ole">
             <mc:AlternateContent xmlns:mc="http://schemas.openxmlformats.org/markup-compatibility/2006">
               <mc:Choice xmlns:v="urn:schemas-microsoft-com:vml" Requires="v">
-                <p:oleObj spid="_x0000_s3077" name="Equation" r:id="rId9" imgW="1066680" imgH="342720" progId="Equation.DSMT4">
+                <p:oleObj spid="_x0000_s3089" name="Equation" r:id="rId9" imgW="1066680" imgH="342720" progId="Equation.DSMT4">
                   <p:embed/>
                 </p:oleObj>
               </mc:Choice>
@@ -5791,7 +5765,7 @@
           <a:graphicData uri="http://schemas.openxmlformats.org/presentationml/2006/ole">
             <mc:AlternateContent xmlns:mc="http://schemas.openxmlformats.org/markup-compatibility/2006">
               <mc:Choice xmlns:v="urn:schemas-microsoft-com:vml" Requires="v">
-                <p:oleObj spid="_x0000_s3078" name="Equation" r:id="rId11" imgW="4508280" imgH="596880" progId="Equation.DSMT4">
+                <p:oleObj spid="_x0000_s3090" name="Equation" r:id="rId11" imgW="4508280" imgH="596880" progId="Equation.DSMT4">
                   <p:embed/>
                 </p:oleObj>
               </mc:Choice>
@@ -5880,7 +5854,7 @@
           <a:graphicData uri="http://schemas.openxmlformats.org/presentationml/2006/ole">
             <mc:AlternateContent xmlns:mc="http://schemas.openxmlformats.org/markup-compatibility/2006">
               <mc:Choice xmlns:v="urn:schemas-microsoft-com:vml" Requires="v">
-                <p:oleObj spid="_x0000_s3079" name="Equation" r:id="rId13" imgW="6438600" imgH="596880" progId="Equation.DSMT4">
+                <p:oleObj spid="_x0000_s3091" name="Equation" r:id="rId13" imgW="6438600" imgH="596880" progId="Equation.DSMT4">
                   <p:embed/>
                 </p:oleObj>
               </mc:Choice>
@@ -6208,7 +6182,7 @@
           <a:graphicData uri="http://schemas.openxmlformats.org/presentationml/2006/ole">
             <mc:AlternateContent xmlns:mc="http://schemas.openxmlformats.org/markup-compatibility/2006">
               <mc:Choice xmlns:v="urn:schemas-microsoft-com:vml" Requires="v">
-                <p:oleObj spid="_x0000_s4098" name="Equation" r:id="rId3" imgW="2082600" imgH="342720" progId="Equation.DSMT4">
+                <p:oleObj spid="_x0000_s4102" name="Equation" r:id="rId3" imgW="2082600" imgH="342720" progId="Equation.DSMT4">
                   <p:embed/>
                 </p:oleObj>
               </mc:Choice>
@@ -6297,7 +6271,7 @@
           <a:graphicData uri="http://schemas.openxmlformats.org/presentationml/2006/ole">
             <mc:AlternateContent xmlns:mc="http://schemas.openxmlformats.org/markup-compatibility/2006">
               <mc:Choice xmlns:v="urn:schemas-microsoft-com:vml" Requires="v">
-                <p:oleObj spid="_x0000_s4099" name="Equation" r:id="rId5" imgW="4787640" imgH="736560" progId="Equation.DSMT4">
+                <p:oleObj spid="_x0000_s4103" name="Equation" r:id="rId5" imgW="4787640" imgH="736560" progId="Equation.DSMT4">
                   <p:embed/>
                 </p:oleObj>
               </mc:Choice>
@@ -7080,7 +7054,7 @@
           <a:graphicData uri="http://schemas.openxmlformats.org/presentationml/2006/ole">
             <mc:AlternateContent xmlns:mc="http://schemas.openxmlformats.org/markup-compatibility/2006">
               <mc:Choice xmlns:v="urn:schemas-microsoft-com:vml" Requires="v">
-                <p:oleObj spid="_x0000_s5122" name="Equation" r:id="rId4" imgW="2831760" imgH="406080" progId="Equation.DSMT4">
+                <p:oleObj spid="_x0000_s5124" name="Equation" r:id="rId4" imgW="2831760" imgH="406080" progId="Equation.DSMT4">
                   <p:embed/>
                 </p:oleObj>
               </mc:Choice>
@@ -7278,6 +7252,10 @@
               <a:rPr kumimoji="0" lang="ko-KR" altLang="en-US" dirty="0"/>
               <a:t>장</a:t>
             </a:r>
+            <a:r>
+              <a:rPr kumimoji="0" lang="en-US" altLang="ko-KR" dirty="0"/>
+              <a:t/>
+            </a:r>
             <a:br>
               <a:rPr kumimoji="0" lang="en-US" altLang="ko-KR" dirty="0"/>
             </a:br>
@@ -8852,7 +8830,7 @@
           <a:graphicData uri="http://schemas.openxmlformats.org/presentationml/2006/ole">
             <mc:AlternateContent xmlns:mc="http://schemas.openxmlformats.org/markup-compatibility/2006">
               <mc:Choice xmlns:v="urn:schemas-microsoft-com:vml" Requires="v">
-                <p:oleObj spid="_x0000_s1026" name="Equation" r:id="rId3" imgW="2070000" imgH="342720" progId="Equation.DSMT4">
+                <p:oleObj spid="_x0000_s1030" name="Equation" r:id="rId3" imgW="2070000" imgH="342720" progId="Equation.DSMT4">
                   <p:embed/>
                 </p:oleObj>
               </mc:Choice>
@@ -8935,7 +8913,7 @@
           <a:graphicData uri="http://schemas.openxmlformats.org/presentationml/2006/ole">
             <mc:AlternateContent xmlns:mc="http://schemas.openxmlformats.org/markup-compatibility/2006">
               <mc:Choice xmlns:v="urn:schemas-microsoft-com:vml" Requires="v">
-                <p:oleObj spid="_x0000_s1027" name="Equation" r:id="rId5" imgW="3136680" imgH="457200" progId="Equation.DSMT4">
+                <p:oleObj spid="_x0000_s1031" name="Equation" r:id="rId5" imgW="3136680" imgH="457200" progId="Equation.DSMT4">
                   <p:embed/>
                 </p:oleObj>
               </mc:Choice>
@@ -9260,7 +9238,7 @@
           <a:graphicData uri="http://schemas.openxmlformats.org/presentationml/2006/ole">
             <mc:AlternateContent xmlns:mc="http://schemas.openxmlformats.org/markup-compatibility/2006">
               <mc:Choice xmlns:v="urn:schemas-microsoft-com:vml" Requires="v">
-                <p:oleObj spid="_x0000_s2050" name="Equation" r:id="rId4" imgW="5155920" imgH="736560" progId="Equation.DSMT4">
+                <p:oleObj spid="_x0000_s2054" name="Equation" r:id="rId4" imgW="5155920" imgH="736560" progId="Equation.DSMT4">
                   <p:embed/>
                 </p:oleObj>
               </mc:Choice>
@@ -9349,7 +9327,7 @@
           <a:graphicData uri="http://schemas.openxmlformats.org/presentationml/2006/ole">
             <mc:AlternateContent xmlns:mc="http://schemas.openxmlformats.org/markup-compatibility/2006">
               <mc:Choice xmlns:v="urn:schemas-microsoft-com:vml" Requires="v">
-                <p:oleObj spid="_x0000_s2051" name="Equation" r:id="rId6" imgW="1879560" imgH="457200" progId="Equation.DSMT4">
+                <p:oleObj spid="_x0000_s2055" name="Equation" r:id="rId6" imgW="1879560" imgH="457200" progId="Equation.DSMT4">
                   <p:embed/>
                 </p:oleObj>
               </mc:Choice>

</xml_diff>

<commit_message>
GitBook: [master] no pages modified
</commit_message>
<xml_diff>
--- a/.gitbook/assets/chapter-04-1-kor.pptx
+++ b/.gitbook/assets/chapter-04-1-kor.pptx
@@ -563,7 +563,7 @@
               <a:pPr>
                 <a:defRPr/>
               </a:pPr>
-              <a:t>2020-01-11</a:t>
+              <a:t>2020-01-08</a:t>
             </a:fld>
             <a:endParaRPr lang="ko-KR" altLang="en-US"/>
           </a:p>
@@ -1020,6 +1020,36 @@
           </a:p>
         </p:txBody>
       </p:sp>
+      <p:pic>
+        <p:nvPicPr>
+          <p:cNvPr id="8" name="그림 7"/>
+          <p:cNvPicPr>
+            <a:picLocks noChangeAspect="1"/>
+          </p:cNvPicPr>
+          <p:nvPr userDrawn="1"/>
+        </p:nvPicPr>
+        <p:blipFill>
+          <a:blip r:embed="rId2" cstate="print">
+            <a:extLst>
+              <a:ext uri="{28A0092B-C50C-407E-A947-70E740481C1C}">
+                <a14:useLocalDpi xmlns:a14="http://schemas.microsoft.com/office/drawing/2010/main" val="0"/>
+              </a:ext>
+            </a:extLst>
+          </a:blip>
+          <a:stretch>
+            <a:fillRect/>
+          </a:stretch>
+        </p:blipFill>
+        <p:spPr>
+          <a:xfrm>
+            <a:off x="-108520" y="143635"/>
+            <a:ext cx="2255525" cy="1146050"/>
+          </a:xfrm>
+          <a:prstGeom prst="rect">
+            <a:avLst/>
+          </a:prstGeom>
+        </p:spPr>
+      </p:pic>
       <p:sp>
         <p:nvSpPr>
           <p:cNvPr id="71" name="정오각형 70"/>
@@ -1789,7 +1819,7 @@
               <a:pPr>
                 <a:defRPr/>
               </a:pPr>
-              <a:t>Saturday, January 11, 2020</a:t>
+              <a:t>Wednesday, January 8, 2020</a:t>
             </a:fld>
             <a:endParaRPr lang="en-US" dirty="0"/>
           </a:p>
@@ -1982,7 +2012,7 @@
               <a:pPr>
                 <a:defRPr/>
               </a:pPr>
-              <a:t>Saturday, January 11, 2020</a:t>
+              <a:t>Wednesday, January 8, 2020</a:t>
             </a:fld>
             <a:endParaRPr lang="en-US"/>
           </a:p>
@@ -2092,7 +2122,7 @@
               <a:pPr>
                 <a:defRPr/>
               </a:pPr>
-              <a:t>Saturday, January 11, 2020</a:t>
+              <a:t>Wednesday, January 8, 2020</a:t>
             </a:fld>
             <a:endParaRPr lang="en-US" dirty="0"/>
           </a:p>
@@ -2452,7 +2482,7 @@
               <a:pPr>
                 <a:defRPr/>
               </a:pPr>
-              <a:t>Saturday, January 11, 2020</a:t>
+              <a:t>Wednesday, January 8, 2020</a:t>
             </a:fld>
             <a:endParaRPr lang="en-US"/>
           </a:p>
@@ -2752,7 +2782,7 @@
               <a:pPr>
                 <a:defRPr/>
               </a:pPr>
-              <a:t>Saturday, January 11, 2020</a:t>
+              <a:t>Wednesday, January 8, 2020</a:t>
             </a:fld>
             <a:endParaRPr lang="en-US"/>
           </a:p>
@@ -3186,7 +3216,7 @@
               <a:pPr>
                 <a:defRPr/>
               </a:pPr>
-              <a:t>Saturday, January 11, 2020</a:t>
+              <a:t>Wednesday, January 8, 2020</a:t>
             </a:fld>
             <a:endParaRPr lang="en-US"/>
           </a:p>
@@ -3318,7 +3348,7 @@
               <a:pPr>
                 <a:defRPr/>
               </a:pPr>
-              <a:t>Saturday, January 11, 2020</a:t>
+              <a:t>Wednesday, January 8, 2020</a:t>
             </a:fld>
             <a:endParaRPr lang="en-US" dirty="0"/>
           </a:p>
@@ -3428,7 +3458,7 @@
               <a:pPr>
                 <a:defRPr/>
               </a:pPr>
-              <a:t>Saturday, January 11, 2020</a:t>
+              <a:t>Wednesday, January 8, 2020</a:t>
             </a:fld>
             <a:endParaRPr lang="en-US"/>
           </a:p>
@@ -3718,7 +3748,7 @@
               <a:pPr>
                 <a:defRPr/>
               </a:pPr>
-              <a:t>Saturday, January 11, 2020</a:t>
+              <a:t>Wednesday, January 8, 2020</a:t>
             </a:fld>
             <a:endParaRPr lang="en-US" dirty="0"/>
           </a:p>
@@ -3985,7 +4015,7 @@
               <a:pPr>
                 <a:defRPr/>
               </a:pPr>
-              <a:t>Saturday, January 11, 2020</a:t>
+              <a:t>Wednesday, January 8, 2020</a:t>
             </a:fld>
             <a:endParaRPr lang="en-US"/>
           </a:p>
@@ -4278,7 +4308,7 @@
               <a:pPr>
                 <a:defRPr/>
               </a:pPr>
-              <a:t>Saturday, January 11, 2020</a:t>
+              <a:t>Wednesday, January 8, 2020</a:t>
             </a:fld>
             <a:endParaRPr lang="en-US" dirty="0"/>
           </a:p>
@@ -4427,8 +4457,8 @@
         </p:nvSpPr>
         <p:spPr bwMode="auto">
           <a:xfrm>
-            <a:off x="8391013" y="6489340"/>
-            <a:ext cx="575799" cy="253916"/>
+            <a:off x="8397425" y="6489340"/>
+            <a:ext cx="569387" cy="261610"/>
           </a:xfrm>
           <a:prstGeom prst="rect">
             <a:avLst/>
@@ -4573,7 +4603,7 @@
               <a:defRPr/>
             </a:pPr>
             <a:fld id="{F60B237E-1E27-414E-981E-8B20D038C067}" type="slidenum">
-              <a:rPr lang="en-US" altLang="ko-KR" sz="1050" b="1" smtClean="0">
+              <a:rPr lang="en-US" altLang="ko-KR" sz="1050" smtClean="0">
                 <a:latin typeface="+mn-ea"/>
                 <a:ea typeface="+mn-ea"/>
               </a:rPr>
@@ -4583,16 +4613,12 @@
               <a:t>‹#›</a:t>
             </a:fld>
             <a:r>
-              <a:rPr lang="en-US" altLang="ko-KR" sz="1050" b="1" dirty="0" smtClean="0">
+              <a:rPr lang="en-US" altLang="ko-KR" sz="1050" dirty="0">
                 <a:latin typeface="+mn-ea"/>
                 <a:ea typeface="+mn-ea"/>
               </a:rPr>
-              <a:t>/13</a:t>
-            </a:r>
-            <a:endParaRPr lang="en-US" altLang="ko-KR" sz="1050" b="1" dirty="0">
-              <a:latin typeface="+mn-ea"/>
-              <a:ea typeface="+mn-ea"/>
-            </a:endParaRPr>
+              <a:t>/31</a:t>
+            </a:r>
           </a:p>
         </p:txBody>
       </p:sp>
@@ -5409,7 +5435,7 @@
           <a:graphicData uri="http://schemas.openxmlformats.org/presentationml/2006/ole">
             <mc:AlternateContent xmlns:mc="http://schemas.openxmlformats.org/markup-compatibility/2006">
               <mc:Choice xmlns:v="urn:schemas-microsoft-com:vml" Requires="v">
-                <p:oleObj spid="_x0000_s3086" name="Equation" r:id="rId3" imgW="3111480" imgH="596880" progId="Equation.DSMT4">
+                <p:oleObj spid="_x0000_s3074" name="Equation" r:id="rId3" imgW="3111480" imgH="596880" progId="Equation.DSMT4">
                   <p:embed/>
                 </p:oleObj>
               </mc:Choice>
@@ -5498,7 +5524,7 @@
           <a:graphicData uri="http://schemas.openxmlformats.org/presentationml/2006/ole">
             <mc:AlternateContent xmlns:mc="http://schemas.openxmlformats.org/markup-compatibility/2006">
               <mc:Choice xmlns:v="urn:schemas-microsoft-com:vml" Requires="v">
-                <p:oleObj spid="_x0000_s3087" name="Equation" r:id="rId5" imgW="3035160" imgH="596880" progId="Equation.DSMT4">
+                <p:oleObj spid="_x0000_s3075" name="Equation" r:id="rId5" imgW="3035160" imgH="596880" progId="Equation.DSMT4">
                   <p:embed/>
                 </p:oleObj>
               </mc:Choice>
@@ -5587,7 +5613,7 @@
           <a:graphicData uri="http://schemas.openxmlformats.org/presentationml/2006/ole">
             <mc:AlternateContent xmlns:mc="http://schemas.openxmlformats.org/markup-compatibility/2006">
               <mc:Choice xmlns:v="urn:schemas-microsoft-com:vml" Requires="v">
-                <p:oleObj spid="_x0000_s3088" name="Equation" r:id="rId7" imgW="2831760" imgH="406080" progId="Equation.DSMT4">
+                <p:oleObj spid="_x0000_s3076" name="Equation" r:id="rId7" imgW="2831760" imgH="406080" progId="Equation.DSMT4">
                   <p:embed/>
                 </p:oleObj>
               </mc:Choice>
@@ -5676,7 +5702,7 @@
           <a:graphicData uri="http://schemas.openxmlformats.org/presentationml/2006/ole">
             <mc:AlternateContent xmlns:mc="http://schemas.openxmlformats.org/markup-compatibility/2006">
               <mc:Choice xmlns:v="urn:schemas-microsoft-com:vml" Requires="v">
-                <p:oleObj spid="_x0000_s3089" name="Equation" r:id="rId9" imgW="1066680" imgH="342720" progId="Equation.DSMT4">
+                <p:oleObj spid="_x0000_s3077" name="Equation" r:id="rId9" imgW="1066680" imgH="342720" progId="Equation.DSMT4">
                   <p:embed/>
                 </p:oleObj>
               </mc:Choice>
@@ -5765,7 +5791,7 @@
           <a:graphicData uri="http://schemas.openxmlformats.org/presentationml/2006/ole">
             <mc:AlternateContent xmlns:mc="http://schemas.openxmlformats.org/markup-compatibility/2006">
               <mc:Choice xmlns:v="urn:schemas-microsoft-com:vml" Requires="v">
-                <p:oleObj spid="_x0000_s3090" name="Equation" r:id="rId11" imgW="4508280" imgH="596880" progId="Equation.DSMT4">
+                <p:oleObj spid="_x0000_s3078" name="Equation" r:id="rId11" imgW="4508280" imgH="596880" progId="Equation.DSMT4">
                   <p:embed/>
                 </p:oleObj>
               </mc:Choice>
@@ -5854,7 +5880,7 @@
           <a:graphicData uri="http://schemas.openxmlformats.org/presentationml/2006/ole">
             <mc:AlternateContent xmlns:mc="http://schemas.openxmlformats.org/markup-compatibility/2006">
               <mc:Choice xmlns:v="urn:schemas-microsoft-com:vml" Requires="v">
-                <p:oleObj spid="_x0000_s3091" name="Equation" r:id="rId13" imgW="6438600" imgH="596880" progId="Equation.DSMT4">
+                <p:oleObj spid="_x0000_s3079" name="Equation" r:id="rId13" imgW="6438600" imgH="596880" progId="Equation.DSMT4">
                   <p:embed/>
                 </p:oleObj>
               </mc:Choice>
@@ -6182,7 +6208,7 @@
           <a:graphicData uri="http://schemas.openxmlformats.org/presentationml/2006/ole">
             <mc:AlternateContent xmlns:mc="http://schemas.openxmlformats.org/markup-compatibility/2006">
               <mc:Choice xmlns:v="urn:schemas-microsoft-com:vml" Requires="v">
-                <p:oleObj spid="_x0000_s4102" name="Equation" r:id="rId3" imgW="2082600" imgH="342720" progId="Equation.DSMT4">
+                <p:oleObj spid="_x0000_s4098" name="Equation" r:id="rId3" imgW="2082600" imgH="342720" progId="Equation.DSMT4">
                   <p:embed/>
                 </p:oleObj>
               </mc:Choice>
@@ -6271,7 +6297,7 @@
           <a:graphicData uri="http://schemas.openxmlformats.org/presentationml/2006/ole">
             <mc:AlternateContent xmlns:mc="http://schemas.openxmlformats.org/markup-compatibility/2006">
               <mc:Choice xmlns:v="urn:schemas-microsoft-com:vml" Requires="v">
-                <p:oleObj spid="_x0000_s4103" name="Equation" r:id="rId5" imgW="4787640" imgH="736560" progId="Equation.DSMT4">
+                <p:oleObj spid="_x0000_s4099" name="Equation" r:id="rId5" imgW="4787640" imgH="736560" progId="Equation.DSMT4">
                   <p:embed/>
                 </p:oleObj>
               </mc:Choice>
@@ -7054,7 +7080,7 @@
           <a:graphicData uri="http://schemas.openxmlformats.org/presentationml/2006/ole">
             <mc:AlternateContent xmlns:mc="http://schemas.openxmlformats.org/markup-compatibility/2006">
               <mc:Choice xmlns:v="urn:schemas-microsoft-com:vml" Requires="v">
-                <p:oleObj spid="_x0000_s5124" name="Equation" r:id="rId4" imgW="2831760" imgH="406080" progId="Equation.DSMT4">
+                <p:oleObj spid="_x0000_s5122" name="Equation" r:id="rId4" imgW="2831760" imgH="406080" progId="Equation.DSMT4">
                   <p:embed/>
                 </p:oleObj>
               </mc:Choice>
@@ -7252,10 +7278,6 @@
               <a:rPr kumimoji="0" lang="ko-KR" altLang="en-US" dirty="0"/>
               <a:t>장</a:t>
             </a:r>
-            <a:r>
-              <a:rPr kumimoji="0" lang="en-US" altLang="ko-KR" dirty="0"/>
-              <a:t/>
-            </a:r>
             <a:br>
               <a:rPr kumimoji="0" lang="en-US" altLang="ko-KR" dirty="0"/>
             </a:br>
@@ -8830,7 +8852,7 @@
           <a:graphicData uri="http://schemas.openxmlformats.org/presentationml/2006/ole">
             <mc:AlternateContent xmlns:mc="http://schemas.openxmlformats.org/markup-compatibility/2006">
               <mc:Choice xmlns:v="urn:schemas-microsoft-com:vml" Requires="v">
-                <p:oleObj spid="_x0000_s1030" name="Equation" r:id="rId3" imgW="2070000" imgH="342720" progId="Equation.DSMT4">
+                <p:oleObj spid="_x0000_s1026" name="Equation" r:id="rId3" imgW="2070000" imgH="342720" progId="Equation.DSMT4">
                   <p:embed/>
                 </p:oleObj>
               </mc:Choice>
@@ -8913,7 +8935,7 @@
           <a:graphicData uri="http://schemas.openxmlformats.org/presentationml/2006/ole">
             <mc:AlternateContent xmlns:mc="http://schemas.openxmlformats.org/markup-compatibility/2006">
               <mc:Choice xmlns:v="urn:schemas-microsoft-com:vml" Requires="v">
-                <p:oleObj spid="_x0000_s1031" name="Equation" r:id="rId5" imgW="3136680" imgH="457200" progId="Equation.DSMT4">
+                <p:oleObj spid="_x0000_s1027" name="Equation" r:id="rId5" imgW="3136680" imgH="457200" progId="Equation.DSMT4">
                   <p:embed/>
                 </p:oleObj>
               </mc:Choice>
@@ -9238,7 +9260,7 @@
           <a:graphicData uri="http://schemas.openxmlformats.org/presentationml/2006/ole">
             <mc:AlternateContent xmlns:mc="http://schemas.openxmlformats.org/markup-compatibility/2006">
               <mc:Choice xmlns:v="urn:schemas-microsoft-com:vml" Requires="v">
-                <p:oleObj spid="_x0000_s2054" name="Equation" r:id="rId4" imgW="5155920" imgH="736560" progId="Equation.DSMT4">
+                <p:oleObj spid="_x0000_s2050" name="Equation" r:id="rId4" imgW="5155920" imgH="736560" progId="Equation.DSMT4">
                   <p:embed/>
                 </p:oleObj>
               </mc:Choice>
@@ -9327,7 +9349,7 @@
           <a:graphicData uri="http://schemas.openxmlformats.org/presentationml/2006/ole">
             <mc:AlternateContent xmlns:mc="http://schemas.openxmlformats.org/markup-compatibility/2006">
               <mc:Choice xmlns:v="urn:schemas-microsoft-com:vml" Requires="v">
-                <p:oleObj spid="_x0000_s2055" name="Equation" r:id="rId6" imgW="1879560" imgH="457200" progId="Equation.DSMT4">
+                <p:oleObj spid="_x0000_s2051" name="Equation" r:id="rId6" imgW="1879560" imgH="457200" progId="Equation.DSMT4">
                   <p:embed/>
                 </p:oleObj>
               </mc:Choice>

</xml_diff>